<commit_message>
ajout de la slide checkout
</commit_message>
<xml_diff>
--- a/GitHub - Cheatsheet.pptx
+++ b/GitHub - Cheatsheet.pptx
@@ -14,6 +14,7 @@
     <p:sldId id="302" r:id="rId8"/>
     <p:sldId id="303" r:id="rId9"/>
     <p:sldId id="305" r:id="rId10"/>
+    <p:sldId id="306" r:id="rId11"/>
   </p:sldIdLst>
   <p:sldSz cx="12192000" cy="6858000"/>
   <p:notesSz cx="6858000" cy="9144000"/>
@@ -267,7 +268,7 @@
           <a:p>
             <a:fld id="{CAED8554-03DB-48D5-B7AD-E651C367FD39}" type="datetimeFigureOut">
               <a:rPr lang="fr-FR" smtClean="0"/>
-              <a:t>25/10/2020</a:t>
+              <a:t>27/10/2020</a:t>
             </a:fld>
             <a:endParaRPr lang="fr-FR"/>
           </a:p>
@@ -465,7 +466,7 @@
           <a:p>
             <a:fld id="{CAED8554-03DB-48D5-B7AD-E651C367FD39}" type="datetimeFigureOut">
               <a:rPr lang="fr-FR" smtClean="0"/>
-              <a:t>25/10/2020</a:t>
+              <a:t>27/10/2020</a:t>
             </a:fld>
             <a:endParaRPr lang="fr-FR"/>
           </a:p>
@@ -673,7 +674,7 @@
           <a:p>
             <a:fld id="{CAED8554-03DB-48D5-B7AD-E651C367FD39}" type="datetimeFigureOut">
               <a:rPr lang="fr-FR" smtClean="0"/>
-              <a:t>25/10/2020</a:t>
+              <a:t>27/10/2020</a:t>
             </a:fld>
             <a:endParaRPr lang="fr-FR"/>
           </a:p>
@@ -871,7 +872,7 @@
           <a:p>
             <a:fld id="{CAED8554-03DB-48D5-B7AD-E651C367FD39}" type="datetimeFigureOut">
               <a:rPr lang="fr-FR" smtClean="0"/>
-              <a:t>25/10/2020</a:t>
+              <a:t>27/10/2020</a:t>
             </a:fld>
             <a:endParaRPr lang="fr-FR"/>
           </a:p>
@@ -1146,7 +1147,7 @@
           <a:p>
             <a:fld id="{CAED8554-03DB-48D5-B7AD-E651C367FD39}" type="datetimeFigureOut">
               <a:rPr lang="fr-FR" smtClean="0"/>
-              <a:t>25/10/2020</a:t>
+              <a:t>27/10/2020</a:t>
             </a:fld>
             <a:endParaRPr lang="fr-FR"/>
           </a:p>
@@ -1411,7 +1412,7 @@
           <a:p>
             <a:fld id="{CAED8554-03DB-48D5-B7AD-E651C367FD39}" type="datetimeFigureOut">
               <a:rPr lang="fr-FR" smtClean="0"/>
-              <a:t>25/10/2020</a:t>
+              <a:t>27/10/2020</a:t>
             </a:fld>
             <a:endParaRPr lang="fr-FR"/>
           </a:p>
@@ -1823,7 +1824,7 @@
           <a:p>
             <a:fld id="{CAED8554-03DB-48D5-B7AD-E651C367FD39}" type="datetimeFigureOut">
               <a:rPr lang="fr-FR" smtClean="0"/>
-              <a:t>25/10/2020</a:t>
+              <a:t>27/10/2020</a:t>
             </a:fld>
             <a:endParaRPr lang="fr-FR"/>
           </a:p>
@@ -1964,7 +1965,7 @@
           <a:p>
             <a:fld id="{CAED8554-03DB-48D5-B7AD-E651C367FD39}" type="datetimeFigureOut">
               <a:rPr lang="fr-FR" smtClean="0"/>
-              <a:t>25/10/2020</a:t>
+              <a:t>27/10/2020</a:t>
             </a:fld>
             <a:endParaRPr lang="fr-FR"/>
           </a:p>
@@ -2077,7 +2078,7 @@
           <a:p>
             <a:fld id="{CAED8554-03DB-48D5-B7AD-E651C367FD39}" type="datetimeFigureOut">
               <a:rPr lang="fr-FR" smtClean="0"/>
-              <a:t>25/10/2020</a:t>
+              <a:t>27/10/2020</a:t>
             </a:fld>
             <a:endParaRPr lang="fr-FR"/>
           </a:p>
@@ -2388,7 +2389,7 @@
           <a:p>
             <a:fld id="{CAED8554-03DB-48D5-B7AD-E651C367FD39}" type="datetimeFigureOut">
               <a:rPr lang="fr-FR" smtClean="0"/>
-              <a:t>25/10/2020</a:t>
+              <a:t>27/10/2020</a:t>
             </a:fld>
             <a:endParaRPr lang="fr-FR"/>
           </a:p>
@@ -2676,7 +2677,7 @@
           <a:p>
             <a:fld id="{CAED8554-03DB-48D5-B7AD-E651C367FD39}" type="datetimeFigureOut">
               <a:rPr lang="fr-FR" smtClean="0"/>
-              <a:t>25/10/2020</a:t>
+              <a:t>27/10/2020</a:t>
             </a:fld>
             <a:endParaRPr lang="fr-FR"/>
           </a:p>
@@ -2917,7 +2918,7 @@
           <a:p>
             <a:fld id="{CAED8554-03DB-48D5-B7AD-E651C367FD39}" type="datetimeFigureOut">
               <a:rPr lang="fr-FR" smtClean="0"/>
-              <a:t>25/10/2020</a:t>
+              <a:t>27/10/2020</a:t>
             </a:fld>
             <a:endParaRPr lang="fr-FR"/>
           </a:p>
@@ -3525,6 +3526,572 @@
     </p:tnLst>
     <p:bldLst>
       <p:bldP spid="7" grpId="0"/>
+    </p:bldLst>
+  </p:timing>
+</p:sld>
+</file>
+
+<file path=ppt/slides/slide10.xml><?xml version="1.0" encoding="utf-8"?>
+<p:sld xmlns:a="http://schemas.openxmlformats.org/drawingml/2006/main" xmlns:r="http://schemas.openxmlformats.org/officeDocument/2006/relationships" xmlns:p="http://schemas.openxmlformats.org/presentationml/2006/main">
+  <p:cSld>
+    <p:bg>
+      <p:bgPr>
+        <a:blipFill dpi="0" rotWithShape="1">
+          <a:blip r:embed="rId2">
+            <a:lum/>
+          </a:blip>
+          <a:srcRect/>
+          <a:stretch>
+            <a:fillRect/>
+          </a:stretch>
+        </a:blipFill>
+        <a:effectLst/>
+      </p:bgPr>
+    </p:bg>
+    <p:spTree>
+      <p:nvGrpSpPr>
+        <p:cNvPr id="1" name=""/>
+        <p:cNvGrpSpPr/>
+        <p:nvPr/>
+      </p:nvGrpSpPr>
+      <p:grpSpPr>
+        <a:xfrm>
+          <a:off x="0" y="0"/>
+          <a:ext cx="0" cy="0"/>
+          <a:chOff x="0" y="0"/>
+          <a:chExt cx="0" cy="0"/>
+        </a:xfrm>
+      </p:grpSpPr>
+      <p:sp>
+        <p:nvSpPr>
+          <p:cNvPr id="4" name="ZoneTexte 3">
+            <a:extLst>
+              <a:ext uri="{FF2B5EF4-FFF2-40B4-BE49-F238E27FC236}">
+                <a16:creationId xmlns:a16="http://schemas.microsoft.com/office/drawing/2014/main" id="{BFFFA16B-5FC4-4764-8A33-6DF8E5D63CDD}"/>
+              </a:ext>
+            </a:extLst>
+          </p:cNvPr>
+          <p:cNvSpPr txBox="1"/>
+          <p:nvPr/>
+        </p:nvSpPr>
+        <p:spPr>
+          <a:xfrm>
+            <a:off x="1189703" y="293118"/>
+            <a:ext cx="7351904" cy="584775"/>
+          </a:xfrm>
+          <a:prstGeom prst="rect">
+            <a:avLst/>
+          </a:prstGeom>
+          <a:noFill/>
+        </p:spPr>
+        <p:txBody>
+          <a:bodyPr wrap="square" rtlCol="0">
+            <a:spAutoFit/>
+          </a:bodyPr>
+          <a:lstStyle/>
+          <a:p>
+            <a:r>
+              <a:rPr lang="fr-FR" sz="3200" dirty="0">
+                <a:solidFill>
+                  <a:schemeClr val="bg1"/>
+                </a:solidFill>
+                <a:latin typeface="Lato" panose="020F0502020204030203" pitchFamily="34" charset="0"/>
+              </a:rPr>
+              <a:t>Git </a:t>
+            </a:r>
+            <a:r>
+              <a:rPr lang="fr-FR" sz="3200" dirty="0" err="1">
+                <a:solidFill>
+                  <a:schemeClr val="bg1"/>
+                </a:solidFill>
+                <a:latin typeface="Lato" panose="020F0502020204030203" pitchFamily="34" charset="0"/>
+              </a:rPr>
+              <a:t>checkout</a:t>
+            </a:r>
+            <a:endParaRPr lang="fr-FR" sz="3200" dirty="0">
+              <a:solidFill>
+                <a:schemeClr val="bg1"/>
+              </a:solidFill>
+              <a:latin typeface="Lato" panose="020F0502020204030203" pitchFamily="34" charset="0"/>
+            </a:endParaRPr>
+          </a:p>
+        </p:txBody>
+      </p:sp>
+      <p:pic>
+        <p:nvPicPr>
+          <p:cNvPr id="6" name="Graphique 5">
+            <a:extLst>
+              <a:ext uri="{FF2B5EF4-FFF2-40B4-BE49-F238E27FC236}">
+                <a16:creationId xmlns:a16="http://schemas.microsoft.com/office/drawing/2014/main" id="{85C30D46-C4D7-46B0-B67D-5769078A0E11}"/>
+              </a:ext>
+            </a:extLst>
+          </p:cNvPr>
+          <p:cNvPicPr>
+            <a:picLocks noChangeAspect="1"/>
+          </p:cNvPicPr>
+          <p:nvPr/>
+        </p:nvPicPr>
+        <p:blipFill>
+          <a:blip r:embed="rId3">
+            <a:extLst>
+              <a:ext uri="{96DAC541-7B7A-43D3-8B79-37D633B846F1}">
+                <asvg:svgBlip xmlns:asvg="http://schemas.microsoft.com/office/drawing/2016/SVG/main" r:embed="rId4"/>
+              </a:ext>
+            </a:extLst>
+          </a:blip>
+          <a:stretch>
+            <a:fillRect/>
+          </a:stretch>
+        </p:blipFill>
+        <p:spPr>
+          <a:xfrm>
+            <a:off x="811468" y="412030"/>
+            <a:ext cx="933450" cy="628650"/>
+          </a:xfrm>
+          <a:prstGeom prst="rect">
+            <a:avLst/>
+          </a:prstGeom>
+        </p:spPr>
+      </p:pic>
+      <p:pic>
+        <p:nvPicPr>
+          <p:cNvPr id="8" name="Graphique 7">
+            <a:extLst>
+              <a:ext uri="{FF2B5EF4-FFF2-40B4-BE49-F238E27FC236}">
+                <a16:creationId xmlns:a16="http://schemas.microsoft.com/office/drawing/2014/main" id="{916392F6-DF46-4701-A225-46CC48370402}"/>
+              </a:ext>
+            </a:extLst>
+          </p:cNvPr>
+          <p:cNvPicPr>
+            <a:picLocks noChangeAspect="1"/>
+          </p:cNvPicPr>
+          <p:nvPr/>
+        </p:nvPicPr>
+        <p:blipFill>
+          <a:blip r:embed="rId5">
+            <a:extLst>
+              <a:ext uri="{96DAC541-7B7A-43D3-8B79-37D633B846F1}">
+                <asvg:svgBlip xmlns:asvg="http://schemas.microsoft.com/office/drawing/2016/SVG/main" r:embed="rId6"/>
+              </a:ext>
+            </a:extLst>
+          </a:blip>
+          <a:stretch>
+            <a:fillRect/>
+          </a:stretch>
+        </p:blipFill>
+        <p:spPr>
+          <a:xfrm>
+            <a:off x="811468" y="412030"/>
+            <a:ext cx="933450" cy="628650"/>
+          </a:xfrm>
+          <a:prstGeom prst="rect">
+            <a:avLst/>
+          </a:prstGeom>
+        </p:spPr>
+      </p:pic>
+      <p:sp>
+        <p:nvSpPr>
+          <p:cNvPr id="7" name="ZoneTexte 6">
+            <a:extLst>
+              <a:ext uri="{FF2B5EF4-FFF2-40B4-BE49-F238E27FC236}">
+                <a16:creationId xmlns:a16="http://schemas.microsoft.com/office/drawing/2014/main" id="{562C651B-0085-4E7D-A9D6-048FE09D50BD}"/>
+              </a:ext>
+            </a:extLst>
+          </p:cNvPr>
+          <p:cNvSpPr txBox="1"/>
+          <p:nvPr/>
+        </p:nvSpPr>
+        <p:spPr>
+          <a:xfrm>
+            <a:off x="1164334" y="1462040"/>
+            <a:ext cx="7935277" cy="400110"/>
+          </a:xfrm>
+          <a:prstGeom prst="rect">
+            <a:avLst/>
+          </a:prstGeom>
+          <a:noFill/>
+        </p:spPr>
+        <p:txBody>
+          <a:bodyPr wrap="square" rtlCol="0">
+            <a:spAutoFit/>
+          </a:bodyPr>
+          <a:lstStyle/>
+          <a:p>
+            <a:r>
+              <a:rPr lang="fr-FR" sz="2000" dirty="0">
+                <a:solidFill>
+                  <a:schemeClr val="bg1"/>
+                </a:solidFill>
+                <a:latin typeface="Lato" panose="020F0502020204030203"/>
+              </a:rPr>
+              <a:t>Ça fait le café (autrement dit ça fait beaucoup de chose)</a:t>
+            </a:r>
+          </a:p>
+        </p:txBody>
+      </p:sp>
+      <p:pic>
+        <p:nvPicPr>
+          <p:cNvPr id="11" name="Image 10" descr="Une image contenant texte&#10;&#10;Description générée automatiquement">
+            <a:extLst>
+              <a:ext uri="{FF2B5EF4-FFF2-40B4-BE49-F238E27FC236}">
+                <a16:creationId xmlns:a16="http://schemas.microsoft.com/office/drawing/2014/main" id="{2275E378-F689-4BA6-8E0A-BADAB065EEB4}"/>
+              </a:ext>
+            </a:extLst>
+          </p:cNvPr>
+          <p:cNvPicPr>
+            <a:picLocks noChangeAspect="1"/>
+          </p:cNvPicPr>
+          <p:nvPr/>
+        </p:nvPicPr>
+        <p:blipFill>
+          <a:blip r:embed="rId7">
+            <a:extLst>
+              <a:ext uri="{28A0092B-C50C-407E-A947-70E740481C1C}">
+                <a14:useLocalDpi xmlns:a14="http://schemas.microsoft.com/office/drawing/2010/main" val="0"/>
+              </a:ext>
+            </a:extLst>
+          </a:blip>
+          <a:stretch>
+            <a:fillRect/>
+          </a:stretch>
+        </p:blipFill>
+        <p:spPr>
+          <a:xfrm>
+            <a:off x="2257425" y="1123950"/>
+            <a:ext cx="7677150" cy="4610100"/>
+          </a:xfrm>
+          <a:prstGeom prst="rect">
+            <a:avLst/>
+          </a:prstGeom>
+        </p:spPr>
+      </p:pic>
+      <p:sp>
+        <p:nvSpPr>
+          <p:cNvPr id="12" name="ZoneTexte 11">
+            <a:extLst>
+              <a:ext uri="{FF2B5EF4-FFF2-40B4-BE49-F238E27FC236}">
+                <a16:creationId xmlns:a16="http://schemas.microsoft.com/office/drawing/2014/main" id="{BE6AC56F-D1E7-42D2-8D01-B1FCD8ADD433}"/>
+              </a:ext>
+            </a:extLst>
+          </p:cNvPr>
+          <p:cNvSpPr txBox="1"/>
+          <p:nvPr/>
+        </p:nvSpPr>
+        <p:spPr>
+          <a:xfrm>
+            <a:off x="1023771" y="4795796"/>
+            <a:ext cx="7935277" cy="1631216"/>
+          </a:xfrm>
+          <a:prstGeom prst="rect">
+            <a:avLst/>
+          </a:prstGeom>
+          <a:noFill/>
+        </p:spPr>
+        <p:txBody>
+          <a:bodyPr wrap="square" rtlCol="0">
+            <a:spAutoFit/>
+          </a:bodyPr>
+          <a:lstStyle/>
+          <a:p>
+            <a:r>
+              <a:rPr lang="fr-FR" sz="2000" dirty="0">
+                <a:solidFill>
+                  <a:srgbClr val="45BABC"/>
+                </a:solidFill>
+                <a:latin typeface="Lato" panose="020F0502020204030203"/>
+              </a:rPr>
+              <a:t>Git </a:t>
+            </a:r>
+            <a:r>
+              <a:rPr lang="fr-FR" sz="2000" dirty="0" err="1">
+                <a:solidFill>
+                  <a:srgbClr val="45BABC"/>
+                </a:solidFill>
+                <a:latin typeface="Lato" panose="020F0502020204030203"/>
+              </a:rPr>
+              <a:t>checkout</a:t>
+            </a:r>
+            <a:r>
+              <a:rPr lang="fr-FR" sz="2000" dirty="0">
+                <a:solidFill>
+                  <a:srgbClr val="45BABC"/>
+                </a:solidFill>
+                <a:latin typeface="Lato" panose="020F0502020204030203"/>
+              </a:rPr>
+              <a:t> </a:t>
+            </a:r>
+            <a:r>
+              <a:rPr lang="fr-FR" sz="2000" dirty="0">
+                <a:solidFill>
+                  <a:schemeClr val="bg1"/>
+                </a:solidFill>
+                <a:latin typeface="Lato" panose="020F0502020204030203"/>
+              </a:rPr>
+              <a:t>: si vous faite « TAB » listera les branches que vous avez sur votre ordinateur</a:t>
+            </a:r>
+          </a:p>
+          <a:p>
+            <a:r>
+              <a:rPr lang="fr-FR" sz="2000" dirty="0">
+                <a:solidFill>
+                  <a:srgbClr val="45BABC"/>
+                </a:solidFill>
+                <a:latin typeface="Lato" panose="020F0502020204030203"/>
+              </a:rPr>
+              <a:t>Git </a:t>
+            </a:r>
+            <a:r>
+              <a:rPr lang="fr-FR" sz="2000" dirty="0" err="1">
+                <a:solidFill>
+                  <a:srgbClr val="45BABC"/>
+                </a:solidFill>
+                <a:latin typeface="Lato" panose="020F0502020204030203"/>
+              </a:rPr>
+              <a:t>checkout</a:t>
+            </a:r>
+            <a:r>
+              <a:rPr lang="fr-FR" sz="2000" dirty="0">
+                <a:solidFill>
+                  <a:srgbClr val="45BABC"/>
+                </a:solidFill>
+                <a:latin typeface="Lato" panose="020F0502020204030203"/>
+              </a:rPr>
+              <a:t> –b </a:t>
+            </a:r>
+            <a:r>
+              <a:rPr lang="fr-FR" sz="2000" dirty="0" err="1">
+                <a:solidFill>
+                  <a:srgbClr val="45BABC"/>
+                </a:solidFill>
+                <a:latin typeface="Lato" panose="020F0502020204030203"/>
+              </a:rPr>
+              <a:t>ma_branche</a:t>
+            </a:r>
+            <a:r>
+              <a:rPr lang="fr-FR" sz="2000" dirty="0">
+                <a:solidFill>
+                  <a:schemeClr val="bg1"/>
+                </a:solidFill>
+                <a:latin typeface="Lato" panose="020F0502020204030203"/>
+              </a:rPr>
+              <a:t> : créer une branche</a:t>
+            </a:r>
+          </a:p>
+          <a:p>
+            <a:r>
+              <a:rPr lang="fr-FR" sz="2000" dirty="0">
+                <a:solidFill>
+                  <a:srgbClr val="45BABC"/>
+                </a:solidFill>
+                <a:latin typeface="Lato" panose="020F0502020204030203"/>
+              </a:rPr>
+              <a:t>Git </a:t>
+            </a:r>
+            <a:r>
+              <a:rPr lang="fr-FR" sz="2000" dirty="0" err="1">
+                <a:solidFill>
+                  <a:srgbClr val="45BABC"/>
+                </a:solidFill>
+                <a:latin typeface="Lato" panose="020F0502020204030203"/>
+              </a:rPr>
+              <a:t>checkout</a:t>
+            </a:r>
+            <a:r>
+              <a:rPr lang="fr-FR" sz="2000" dirty="0">
+                <a:solidFill>
+                  <a:srgbClr val="45BABC"/>
+                </a:solidFill>
+                <a:latin typeface="Lato" panose="020F0502020204030203"/>
+              </a:rPr>
+              <a:t> </a:t>
+            </a:r>
+            <a:r>
+              <a:rPr lang="fr-FR" sz="2000" dirty="0" err="1">
+                <a:solidFill>
+                  <a:srgbClr val="45BABC"/>
+                </a:solidFill>
+                <a:latin typeface="Lato" panose="020F0502020204030203"/>
+              </a:rPr>
+              <a:t>ma_branche</a:t>
+            </a:r>
+            <a:r>
+              <a:rPr lang="fr-FR" sz="2000" dirty="0">
+                <a:solidFill>
+                  <a:schemeClr val="bg1"/>
+                </a:solidFill>
+                <a:latin typeface="Lato" panose="020F0502020204030203"/>
+              </a:rPr>
+              <a:t> : va vous déplacer sur la branche « </a:t>
+            </a:r>
+            <a:r>
+              <a:rPr lang="fr-FR" sz="2000" dirty="0" err="1">
+                <a:solidFill>
+                  <a:schemeClr val="bg1"/>
+                </a:solidFill>
+                <a:latin typeface="Lato" panose="020F0502020204030203"/>
+              </a:rPr>
+              <a:t>ma_branche</a:t>
+            </a:r>
+            <a:r>
+              <a:rPr lang="fr-FR" sz="2000" dirty="0">
+                <a:solidFill>
+                  <a:schemeClr val="bg1"/>
+                </a:solidFill>
+                <a:latin typeface="Lato" panose="020F0502020204030203"/>
+              </a:rPr>
+              <a:t> »</a:t>
+            </a:r>
+          </a:p>
+        </p:txBody>
+      </p:sp>
+    </p:spTree>
+    <p:extLst>
+      <p:ext uri="{BB962C8B-B14F-4D97-AF65-F5344CB8AC3E}">
+        <p14:creationId xmlns:p14="http://schemas.microsoft.com/office/powerpoint/2010/main" val="2389736348"/>
+      </p:ext>
+    </p:extLst>
+  </p:cSld>
+  <p:clrMapOvr>
+    <a:masterClrMapping/>
+  </p:clrMapOvr>
+  <p:timing>
+    <p:tnLst>
+      <p:par>
+        <p:cTn id="1" dur="indefinite" restart="never" nodeType="tmRoot">
+          <p:childTnLst>
+            <p:seq concurrent="1" nextAc="seek">
+              <p:cTn id="2" dur="indefinite" nodeType="mainSeq">
+                <p:childTnLst>
+                  <p:par>
+                    <p:cTn id="3" fill="hold">
+                      <p:stCondLst>
+                        <p:cond delay="indefinite"/>
+                      </p:stCondLst>
+                      <p:childTnLst>
+                        <p:par>
+                          <p:cTn id="4" fill="hold">
+                            <p:stCondLst>
+                              <p:cond delay="0"/>
+                            </p:stCondLst>
+                            <p:childTnLst>
+                              <p:par>
+                                <p:cTn id="5" presetID="10" presetClass="entr" presetSubtype="0" fill="hold" grpId="0" nodeType="clickEffect">
+                                  <p:stCondLst>
+                                    <p:cond delay="0"/>
+                                  </p:stCondLst>
+                                  <p:childTnLst>
+                                    <p:set>
+                                      <p:cBhvr>
+                                        <p:cTn id="6" dur="1" fill="hold">
+                                          <p:stCondLst>
+                                            <p:cond delay="0"/>
+                                          </p:stCondLst>
+                                        </p:cTn>
+                                        <p:tgtEl>
+                                          <p:spTgt spid="7"/>
+                                        </p:tgtEl>
+                                        <p:attrNameLst>
+                                          <p:attrName>style.visibility</p:attrName>
+                                        </p:attrNameLst>
+                                      </p:cBhvr>
+                                      <p:to>
+                                        <p:strVal val="visible"/>
+                                      </p:to>
+                                    </p:set>
+                                    <p:animEffect transition="in" filter="fade">
+                                      <p:cBhvr>
+                                        <p:cTn id="7" dur="500"/>
+                                        <p:tgtEl>
+                                          <p:spTgt spid="7"/>
+                                        </p:tgtEl>
+                                      </p:cBhvr>
+                                    </p:animEffect>
+                                  </p:childTnLst>
+                                </p:cTn>
+                              </p:par>
+                            </p:childTnLst>
+                          </p:cTn>
+                        </p:par>
+                      </p:childTnLst>
+                    </p:cTn>
+                  </p:par>
+                  <p:par>
+                    <p:cTn id="8" fill="hold">
+                      <p:stCondLst>
+                        <p:cond delay="indefinite"/>
+                      </p:stCondLst>
+                      <p:childTnLst>
+                        <p:par>
+                          <p:cTn id="9" fill="hold">
+                            <p:stCondLst>
+                              <p:cond delay="0"/>
+                            </p:stCondLst>
+                            <p:childTnLst>
+                              <p:par>
+                                <p:cTn id="10" presetID="10" presetClass="entr" presetSubtype="0" fill="hold" grpId="0" nodeType="clickEffect">
+                                  <p:stCondLst>
+                                    <p:cond delay="0"/>
+                                  </p:stCondLst>
+                                  <p:childTnLst>
+                                    <p:set>
+                                      <p:cBhvr>
+                                        <p:cTn id="11" dur="1" fill="hold">
+                                          <p:stCondLst>
+                                            <p:cond delay="0"/>
+                                          </p:stCondLst>
+                                        </p:cTn>
+                                        <p:tgtEl>
+                                          <p:spTgt spid="12"/>
+                                        </p:tgtEl>
+                                        <p:attrNameLst>
+                                          <p:attrName>style.visibility</p:attrName>
+                                        </p:attrNameLst>
+                                      </p:cBhvr>
+                                      <p:to>
+                                        <p:strVal val="visible"/>
+                                      </p:to>
+                                    </p:set>
+                                    <p:animEffect transition="in" filter="fade">
+                                      <p:cBhvr>
+                                        <p:cTn id="12" dur="500"/>
+                                        <p:tgtEl>
+                                          <p:spTgt spid="12"/>
+                                        </p:tgtEl>
+                                      </p:cBhvr>
+                                    </p:animEffect>
+                                  </p:childTnLst>
+                                </p:cTn>
+                              </p:par>
+                            </p:childTnLst>
+                          </p:cTn>
+                        </p:par>
+                      </p:childTnLst>
+                    </p:cTn>
+                  </p:par>
+                </p:childTnLst>
+              </p:cTn>
+              <p:prevCondLst>
+                <p:cond evt="onPrev" delay="0">
+                  <p:tgtEl>
+                    <p:sldTgt/>
+                  </p:tgtEl>
+                </p:cond>
+              </p:prevCondLst>
+              <p:nextCondLst>
+                <p:cond evt="onNext" delay="0">
+                  <p:tgtEl>
+                    <p:sldTgt/>
+                  </p:tgtEl>
+                </p:cond>
+              </p:nextCondLst>
+            </p:seq>
+          </p:childTnLst>
+        </p:cTn>
+      </p:par>
+    </p:tnLst>
+    <p:bldLst>
+      <p:bldP spid="7" grpId="0"/>
+      <p:bldP spid="12" grpId="0"/>
     </p:bldLst>
   </p:timing>
 </p:sld>

</xml_diff>